<commit_message>
revised .ppt for pandaswk3.2
</commit_message>
<xml_diff>
--- a/Power Points/PandasWk4.2.pptx
+++ b/Power Points/PandasWk4.2.pptx
@@ -242,7 +242,7 @@
           <a:p>
             <a:fld id="{51A969EA-8566-418D-AC96-BC5F6E9FAB6C}" type="datetimeFigureOut">
               <a:rPr lang="en-US" smtClean="0"/>
-              <a:t>12/2/18</a:t>
+              <a:t>12/4/18</a:t>
             </a:fld>
             <a:endParaRPr lang="en-US"/>
           </a:p>
@@ -407,7 +407,7 @@
           <a:p>
             <a:fld id="{33B07B4B-74D8-4C42-A719-1F93879497F8}" type="datetimeFigureOut">
               <a:rPr lang="en-US" smtClean="0"/>
-              <a:t>12/2/18</a:t>
+              <a:t>12/4/18</a:t>
             </a:fld>
             <a:endParaRPr lang="en-US"/>
           </a:p>
@@ -2302,7 +2302,7 @@
           <a:p>
             <a:fld id="{B65C9255-9F07-4181-9AD2-897FFC0A3B7E}" type="datetimeFigureOut">
               <a:rPr lang="en-US" smtClean="0"/>
-              <a:t>12/2/18</a:t>
+              <a:t>12/4/18</a:t>
             </a:fld>
             <a:endParaRPr lang="en-US"/>
           </a:p>
@@ -2504,7 +2504,7 @@
           <a:p>
             <a:fld id="{B65C9255-9F07-4181-9AD2-897FFC0A3B7E}" type="datetimeFigureOut">
               <a:rPr lang="en-US" smtClean="0"/>
-              <a:t>12/2/18</a:t>
+              <a:t>12/4/18</a:t>
             </a:fld>
             <a:endParaRPr lang="en-US"/>
           </a:p>
@@ -2727,7 +2727,7 @@
           <a:p>
             <a:fld id="{B65C9255-9F07-4181-9AD2-897FFC0A3B7E}" type="datetimeFigureOut">
               <a:rPr lang="en-US" smtClean="0"/>
-              <a:t>12/2/18</a:t>
+              <a:t>12/4/18</a:t>
             </a:fld>
             <a:endParaRPr lang="en-US"/>
           </a:p>
@@ -3731,7 +3731,7 @@
         <p:spPr>
           <a:xfrm>
             <a:off x="304800" y="709910"/>
-            <a:ext cx="8534400" cy="5601533"/>
+            <a:ext cx="8534400" cy="5970865"/>
           </a:xfrm>
           <a:prstGeom prst="rect">
             <a:avLst/>
@@ -3798,7 +3798,7 @@
             </a:r>
             <a:r>
               <a:rPr lang="en-US" sz="2400"/>
-              <a:t>used to identify missing value</a:t>
+              <a:t>used to identify missing value – giving the total rows that do not contain NaN</a:t>
             </a:r>
           </a:p>
           <a:p>
@@ -4216,7 +4216,7 @@
             </a:r>
             <a:r>
               <a:rPr lang="en-US" sz="2000"/>
-              <a:t>to find values that have similar/misspelled values</a:t>
+              <a:t>returns unique entries in series and useful to find values that have similar/misspelled values</a:t>
             </a:r>
           </a:p>
           <a:p>

</xml_diff>